<commit_message>
Adding Josh's presentation update
</commit_message>
<xml_diff>
--- a/Presentations/ProjectPresentation_03-11-JM.pptx
+++ b/Presentations/ProjectPresentation_03-11-JM.pptx
@@ -284,7 +284,7 @@
           <a:p>
             <a:fld id="{CD63FF02-0E8F-C94D-9333-E7E525B6484A}" type="datetimeFigureOut">
               <a:rPr lang="en-US" smtClean="0"/>
-              <a:t>3/11/2021</a:t>
+              <a:t>3/15/2021</a:t>
             </a:fld>
             <a:endParaRPr lang="en-US"/>
           </a:p>
@@ -482,7 +482,7 @@
           <a:p>
             <a:fld id="{CD63FF02-0E8F-C94D-9333-E7E525B6484A}" type="datetimeFigureOut">
               <a:rPr lang="en-US" smtClean="0"/>
-              <a:t>3/11/2021</a:t>
+              <a:t>3/15/2021</a:t>
             </a:fld>
             <a:endParaRPr lang="en-US"/>
           </a:p>
@@ -690,7 +690,7 @@
           <a:p>
             <a:fld id="{CD63FF02-0E8F-C94D-9333-E7E525B6484A}" type="datetimeFigureOut">
               <a:rPr lang="en-US" smtClean="0"/>
-              <a:t>3/11/2021</a:t>
+              <a:t>3/15/2021</a:t>
             </a:fld>
             <a:endParaRPr lang="en-US"/>
           </a:p>
@@ -893,7 +893,7 @@
           <a:p>
             <a:fld id="{CD63FF02-0E8F-C94D-9333-E7E525B6484A}" type="datetimeFigureOut">
               <a:rPr lang="en-US" smtClean="0"/>
-              <a:t>3/11/2021</a:t>
+              <a:t>3/15/2021</a:t>
             </a:fld>
             <a:endParaRPr lang="en-US"/>
           </a:p>
@@ -1168,7 +1168,7 @@
           <a:p>
             <a:fld id="{CD63FF02-0E8F-C94D-9333-E7E525B6484A}" type="datetimeFigureOut">
               <a:rPr lang="en-US" smtClean="0"/>
-              <a:t>3/11/2021</a:t>
+              <a:t>3/15/2021</a:t>
             </a:fld>
             <a:endParaRPr lang="en-US"/>
           </a:p>
@@ -1433,7 +1433,7 @@
           <a:p>
             <a:fld id="{CD63FF02-0E8F-C94D-9333-E7E525B6484A}" type="datetimeFigureOut">
               <a:rPr lang="en-US" smtClean="0"/>
-              <a:t>3/11/2021</a:t>
+              <a:t>3/15/2021</a:t>
             </a:fld>
             <a:endParaRPr lang="en-US"/>
           </a:p>
@@ -1845,7 +1845,7 @@
           <a:p>
             <a:fld id="{CD63FF02-0E8F-C94D-9333-E7E525B6484A}" type="datetimeFigureOut">
               <a:rPr lang="en-US" smtClean="0"/>
-              <a:t>3/11/2021</a:t>
+              <a:t>3/15/2021</a:t>
             </a:fld>
             <a:endParaRPr lang="en-US"/>
           </a:p>
@@ -1986,7 +1986,7 @@
           <a:p>
             <a:fld id="{CD63FF02-0E8F-C94D-9333-E7E525B6484A}" type="datetimeFigureOut">
               <a:rPr lang="en-US" smtClean="0"/>
-              <a:t>3/11/2021</a:t>
+              <a:t>3/15/2021</a:t>
             </a:fld>
             <a:endParaRPr lang="en-US"/>
           </a:p>
@@ -2099,7 +2099,7 @@
           <a:p>
             <a:fld id="{CD63FF02-0E8F-C94D-9333-E7E525B6484A}" type="datetimeFigureOut">
               <a:rPr lang="en-US" smtClean="0"/>
-              <a:t>3/11/2021</a:t>
+              <a:t>3/15/2021</a:t>
             </a:fld>
             <a:endParaRPr lang="en-US"/>
           </a:p>
@@ -2410,7 +2410,7 @@
           <a:p>
             <a:fld id="{CD63FF02-0E8F-C94D-9333-E7E525B6484A}" type="datetimeFigureOut">
               <a:rPr lang="en-US" smtClean="0"/>
-              <a:t>3/11/2021</a:t>
+              <a:t>3/15/2021</a:t>
             </a:fld>
             <a:endParaRPr lang="en-US"/>
           </a:p>
@@ -2698,7 +2698,7 @@
           <a:p>
             <a:fld id="{CD63FF02-0E8F-C94D-9333-E7E525B6484A}" type="datetimeFigureOut">
               <a:rPr lang="en-US" smtClean="0"/>
-              <a:t>3/11/2021</a:t>
+              <a:t>3/15/2021</a:t>
             </a:fld>
             <a:endParaRPr lang="en-US"/>
           </a:p>
@@ -2948,7 +2948,7 @@
           <a:p>
             <a:fld id="{CD63FF02-0E8F-C94D-9333-E7E525B6484A}" type="datetimeFigureOut">
               <a:rPr lang="en-US" smtClean="0"/>
-              <a:t>3/11/2021</a:t>
+              <a:t>3/15/2021</a:t>
             </a:fld>
             <a:endParaRPr lang="en-US"/>
           </a:p>
@@ -4014,7 +4014,7 @@
           <p:nvPr>
             <p:extLst>
               <p:ext uri="{D42A27DB-BD31-4B8C-83A1-F6EECF244321}">
-                <p14:modId xmlns:p14="http://schemas.microsoft.com/office/powerpoint/2010/main" val="504638804"/>
+                <p14:modId xmlns:p14="http://schemas.microsoft.com/office/powerpoint/2010/main" val="978037231"/>
               </p:ext>
             </p:extLst>
           </p:nvPr>
@@ -4845,13 +4845,18 @@
                     <a:p>
                       <a:pPr algn="ctr"/>
                       <a:r>
-                        <a:rPr lang="en-US" b="0" dirty="0">
+                        <a:rPr lang="en-US" b="0">
                           <a:solidFill>
                             <a:schemeClr val="tx1"/>
                           </a:solidFill>
                         </a:rPr>
-                        <a:t>11</a:t>
+                        <a:t>10</a:t>
                       </a:r>
+                      <a:endParaRPr lang="en-US" b="0" dirty="0">
+                        <a:solidFill>
+                          <a:schemeClr val="tx1"/>
+                        </a:solidFill>
+                      </a:endParaRPr>
                     </a:p>
                   </a:txBody>
                   <a:tcPr>

</xml_diff>